<commit_message>
comleted the progress review presenataion
</commit_message>
<xml_diff>
--- a/assignments_material/LPS-progress-review-december_2021.pptx
+++ b/assignments_material/LPS-progress-review-december_2021.pptx
@@ -9,9 +9,10 @@
     <p:sldId id="259" r:id="rId3"/>
     <p:sldId id="260" r:id="rId4"/>
     <p:sldId id="261" r:id="rId5"/>
-    <p:sldId id="258" r:id="rId6"/>
-    <p:sldId id="262" r:id="rId7"/>
-    <p:sldId id="263" r:id="rId8"/>
+    <p:sldId id="264" r:id="rId6"/>
+    <p:sldId id="258" r:id="rId7"/>
+    <p:sldId id="262" r:id="rId8"/>
+    <p:sldId id="263" r:id="rId9"/>
   </p:sldIdLst>
   <p:sldSz cx="12192000" cy="6858000"/>
   <p:notesSz cx="6858000" cy="9144000"/>
@@ -110,6 +111,11 @@
       </a:defRPr>
     </a:lvl9pPr>
   </p:defaultTextStyle>
+  <p:extLst>
+    <p:ext uri="{EFAFB233-063F-42B5-8137-9DF3F51BA10A}">
+      <p15:sldGuideLst xmlns:p15="http://schemas.microsoft.com/office/powerpoint/2012/main"/>
+    </p:ext>
+  </p:extLst>
 </p:presentation>
 </file>
 
@@ -8657,8 +8663,8 @@
         </p:nvSpPr>
         <p:spPr>
           <a:xfrm>
-            <a:off x="841248" y="636270"/>
-            <a:ext cx="4892040" cy="1289304"/>
+            <a:off x="176802" y="128016"/>
+            <a:ext cx="5445045" cy="1289304"/>
           </a:xfrm>
         </p:spPr>
         <p:txBody>
@@ -8692,8 +8698,8 @@
         </p:nvSpPr>
         <p:spPr>
           <a:xfrm>
-            <a:off x="841248" y="1925574"/>
-            <a:ext cx="4887657" cy="4635024"/>
+            <a:off x="273374" y="1782147"/>
+            <a:ext cx="5455531" cy="4778451"/>
           </a:xfrm>
         </p:spPr>
         <p:txBody>
@@ -8854,7 +8860,7 @@
         </p:blipFill>
         <p:spPr>
           <a:xfrm rot="16200000">
-            <a:off x="7331425" y="920809"/>
+            <a:off x="7153308" y="407627"/>
             <a:ext cx="3859218" cy="5025525"/>
           </a:xfrm>
           <a:prstGeom prst="rect">
@@ -8862,6 +8868,47 @@
           </a:prstGeom>
         </p:spPr>
       </p:pic>
+      <p:sp>
+        <p:nvSpPr>
+          <p:cNvPr id="3" name="TextBox 2">
+            <a:extLst>
+              <a:ext uri="{FF2B5EF4-FFF2-40B4-BE49-F238E27FC236}">
+                <a16:creationId xmlns:a16="http://schemas.microsoft.com/office/drawing/2014/main" id="{96FA1041-E502-4E24-82C1-C3D58B5DAF19}"/>
+              </a:ext>
+            </a:extLst>
+          </p:cNvPr>
+          <p:cNvSpPr txBox="1"/>
+          <p:nvPr/>
+        </p:nvSpPr>
+        <p:spPr>
+          <a:xfrm>
+            <a:off x="6570153" y="5072373"/>
+            <a:ext cx="5455532" cy="646331"/>
+          </a:xfrm>
+          <a:prstGeom prst="rect">
+            <a:avLst/>
+          </a:prstGeom>
+          <a:noFill/>
+        </p:spPr>
+        <p:txBody>
+          <a:bodyPr wrap="none" rtlCol="0">
+            <a:spAutoFit/>
+          </a:bodyPr>
+          <a:lstStyle/>
+          <a:p>
+            <a:r>
+              <a:rPr lang="en-US" dirty="0"/>
+              <a:t>The maximum voltage we can have in the input is 19.2V </a:t>
+            </a:r>
+          </a:p>
+          <a:p>
+            <a:r>
+              <a:rPr lang="en-US" dirty="0"/>
+              <a:t>(after rectifying).Thus the circuit is not practical.</a:t>
+            </a:r>
+          </a:p>
+        </p:txBody>
+      </p:sp>
     </p:spTree>
     <p:extLst>
       <p:ext uri="{BB962C8B-B14F-4D97-AF65-F5344CB8AC3E}">
@@ -8902,10 +8949,118 @@
       </p:grpSpPr>
       <p:sp>
         <p:nvSpPr>
-          <p:cNvPr id="10" name="Rectangle 9">
-            <a:extLst>
-              <a:ext uri="{FF2B5EF4-FFF2-40B4-BE49-F238E27FC236}">
-                <a16:creationId xmlns:a16="http://schemas.microsoft.com/office/drawing/2014/main" id="{D7A453D2-15D8-4403-815F-291FA16340D9}"/>
+          <p:cNvPr id="2" name="Title 1">
+            <a:extLst>
+              <a:ext uri="{FF2B5EF4-FFF2-40B4-BE49-F238E27FC236}">
+                <a16:creationId xmlns:a16="http://schemas.microsoft.com/office/drawing/2014/main" id="{D2566A0C-3777-4717-B6D0-264768368000}"/>
+              </a:ext>
+            </a:extLst>
+          </p:cNvPr>
+          <p:cNvSpPr>
+            <a:spLocks noGrp="1"/>
+          </p:cNvSpPr>
+          <p:nvPr>
+            <p:ph type="title"/>
+          </p:nvPr>
+        </p:nvSpPr>
+        <p:spPr>
+          <a:xfrm>
+            <a:off x="648929" y="629266"/>
+            <a:ext cx="3667039" cy="1676603"/>
+          </a:xfrm>
+        </p:spPr>
+        <p:txBody>
+          <a:bodyPr vert="horz" lIns="91440" tIns="45720" rIns="91440" bIns="45720" rtlCol="0" anchor="ctr">
+            <a:normAutofit/>
+          </a:bodyPr>
+          <a:lstStyle/>
+          <a:p>
+            <a:r>
+              <a:rPr lang="en-US" sz="3600" b="1" dirty="0"/>
+              <a:t>Using a MOSFET instead of Darlington Pairs</a:t>
+            </a:r>
+          </a:p>
+        </p:txBody>
+      </p:sp>
+      <p:sp>
+        <p:nvSpPr>
+          <p:cNvPr id="6" name="TextBox 5">
+            <a:extLst>
+              <a:ext uri="{FF2B5EF4-FFF2-40B4-BE49-F238E27FC236}">
+                <a16:creationId xmlns:a16="http://schemas.microsoft.com/office/drawing/2014/main" id="{350EAFD9-DCB3-4D8C-BACE-CFF09487DC2F}"/>
+              </a:ext>
+            </a:extLst>
+          </p:cNvPr>
+          <p:cNvSpPr txBox="1"/>
+          <p:nvPr/>
+        </p:nvSpPr>
+        <p:spPr>
+          <a:xfrm>
+            <a:off x="648931" y="2438401"/>
+            <a:ext cx="3667036" cy="3779520"/>
+          </a:xfrm>
+          <a:prstGeom prst="rect">
+            <a:avLst/>
+          </a:prstGeom>
+        </p:spPr>
+        <p:txBody>
+          <a:bodyPr vert="horz" lIns="91440" tIns="45720" rIns="91440" bIns="45720" rtlCol="0">
+            <a:normAutofit/>
+          </a:bodyPr>
+          <a:lstStyle/>
+          <a:p>
+            <a:pPr>
+              <a:lnSpc>
+                <a:spcPct val="90000"/>
+              </a:lnSpc>
+              <a:spcAft>
+                <a:spcPts val="600"/>
+              </a:spcAft>
+            </a:pPr>
+            <a:endParaRPr lang="en-US" dirty="0"/>
+          </a:p>
+          <a:p>
+            <a:pPr>
+              <a:lnSpc>
+                <a:spcPct val="90000"/>
+              </a:lnSpc>
+              <a:spcAft>
+                <a:spcPts val="600"/>
+              </a:spcAft>
+            </a:pPr>
+            <a:r>
+              <a:rPr lang="en-US" dirty="0"/>
+              <a:t>Now the voltage drop around the MOSFET  is only 0.3V (At 5V V</a:t>
+            </a:r>
+            <a:r>
+              <a:rPr lang="en-US" baseline="-25000" dirty="0"/>
+              <a:t>GS</a:t>
+            </a:r>
+            <a:r>
+              <a:rPr lang="en-US" dirty="0"/>
+              <a:t>  )</a:t>
+            </a:r>
+            <a:endParaRPr lang="en-US" baseline="-25000" dirty="0"/>
+          </a:p>
+          <a:p>
+            <a:pPr>
+              <a:lnSpc>
+                <a:spcPct val="90000"/>
+              </a:lnSpc>
+              <a:spcAft>
+                <a:spcPts val="600"/>
+              </a:spcAft>
+            </a:pPr>
+            <a:endParaRPr lang="en-US" dirty="0"/>
+          </a:p>
+        </p:txBody>
+      </p:sp>
+      <p:sp>
+        <p:nvSpPr>
+          <p:cNvPr id="11" name="Rectangle 10">
+            <a:extLst>
+              <a:ext uri="{FF2B5EF4-FFF2-40B4-BE49-F238E27FC236}">
+                <a16:creationId xmlns:a16="http://schemas.microsoft.com/office/drawing/2014/main" id="{F2B38F72-8FC4-4001-8C67-FA6B86DEC767}"/>
               </a:ext>
               <a:ext uri="{C183D7F6-B498-43B3-948B-1728B52AA6E4}">
                 <adec:decorative xmlns:adec="http://schemas.microsoft.com/office/drawing/2017/decorative" val="1"/>
@@ -8925,14 +9080,14 @@
         </p:nvSpPr>
         <p:spPr>
           <a:xfrm>
-            <a:off x="3048" y="0"/>
-            <a:ext cx="12188952" cy="6858000"/>
+            <a:off x="4636008" y="2"/>
+            <a:ext cx="7555992" cy="6857998"/>
           </a:xfrm>
           <a:prstGeom prst="rect">
             <a:avLst/>
           </a:prstGeom>
           <a:solidFill>
-            <a:schemeClr val="tx2"/>
+            <a:schemeClr val="tx1"/>
           </a:solidFill>
           <a:ln>
             <a:noFill/>
@@ -8963,1623 +9118,85 @@
           </a:p>
         </p:txBody>
       </p:sp>
-      <p:sp>
-        <p:nvSpPr>
-          <p:cNvPr id="12" name="Rectangle 11">
-            <a:extLst>
-              <a:ext uri="{FF2B5EF4-FFF2-40B4-BE49-F238E27FC236}">
-                <a16:creationId xmlns:a16="http://schemas.microsoft.com/office/drawing/2014/main" id="{8161EA6B-09CA-445B-AB0D-8DF76FA92DEF}"/>
-              </a:ext>
-              <a:ext uri="{C183D7F6-B498-43B3-948B-1728B52AA6E4}">
-                <adec:decorative xmlns:adec="http://schemas.microsoft.com/office/drawing/2017/decorative" val="1"/>
-              </a:ext>
-            </a:extLst>
-          </p:cNvPr>
-          <p:cNvSpPr>
-            <a:spLocks noGrp="1" noRot="1" noChangeAspect="1" noMove="1" noResize="1" noEditPoints="1" noAdjustHandles="1" noChangeArrowheads="1" noChangeShapeType="1" noTextEdit="1"/>
-          </p:cNvSpPr>
+      <p:pic>
+        <p:nvPicPr>
+          <p:cNvPr id="5" name="Content Placeholder 4" descr="Diagram&#10;&#10;Description automatically generated">
+            <a:extLst>
+              <a:ext uri="{FF2B5EF4-FFF2-40B4-BE49-F238E27FC236}">
+                <a16:creationId xmlns:a16="http://schemas.microsoft.com/office/drawing/2014/main" id="{923259F1-1E3F-48F2-9E55-FC438D061C61}"/>
+              </a:ext>
+            </a:extLst>
+          </p:cNvPr>
+          <p:cNvPicPr>
+            <a:picLocks noGrp="1" noChangeAspect="1"/>
+          </p:cNvPicPr>
           <p:nvPr>
-            <p:extLst>
-              <p:ext uri="{386F3935-93C4-4BCD-93E2-E3B085C9AB24}">
-                <p16:designElem xmlns:p16="http://schemas.microsoft.com/office/powerpoint/2015/main" val="1"/>
-              </p:ext>
-            </p:extLst>
+            <p:ph idx="1"/>
           </p:nvPr>
-        </p:nvSpPr>
+        </p:nvPicPr>
+        <p:blipFill rotWithShape="1">
+          <a:blip r:embed="rId2">
+            <a:extLst>
+              <a:ext uri="{28A0092B-C50C-407E-A947-70E740481C1C}">
+                <a14:useLocalDpi xmlns:a14="http://schemas.microsoft.com/office/drawing/2010/main" val="0"/>
+              </a:ext>
+            </a:extLst>
+          </a:blip>
+          <a:srcRect t="3137" r="2" b="2"/>
+          <a:stretch/>
+        </p:blipFill>
         <p:spPr>
           <a:xfrm>
-            <a:off x="0" y="0"/>
-            <a:ext cx="12188952" cy="6858000"/>
+            <a:off x="5276088" y="640082"/>
+            <a:ext cx="6276250" cy="5577838"/>
           </a:xfrm>
           <a:prstGeom prst="rect">
             <a:avLst/>
           </a:prstGeom>
-          <a:solidFill>
-            <a:schemeClr val="tx1">
-              <a:alpha val="53000"/>
-            </a:schemeClr>
-          </a:solidFill>
-          <a:ln>
-            <a:noFill/>
-          </a:ln>
-        </p:spPr>
-        <p:style>
-          <a:lnRef idx="2">
-            <a:schemeClr val="accent1">
-              <a:shade val="50000"/>
-            </a:schemeClr>
-          </a:lnRef>
-          <a:fillRef idx="1">
-            <a:schemeClr val="accent1"/>
-          </a:fillRef>
-          <a:effectRef idx="0">
-            <a:schemeClr val="accent1"/>
-          </a:effectRef>
-          <a:fontRef idx="minor">
-            <a:schemeClr val="lt1"/>
-          </a:fontRef>
-        </p:style>
-        <p:txBody>
-          <a:bodyPr rtlCol="0" anchor="ctr"/>
-          <a:lstStyle/>
-          <a:p>
-            <a:pPr algn="ctr"/>
-            <a:endParaRPr lang="en-US"/>
-          </a:p>
-        </p:txBody>
-      </p:sp>
-      <p:grpSp>
-        <p:nvGrpSpPr>
-          <p:cNvPr id="14" name="Group 13">
-            <a:extLst>
-              <a:ext uri="{FF2B5EF4-FFF2-40B4-BE49-F238E27FC236}">
-                <a16:creationId xmlns:a16="http://schemas.microsoft.com/office/drawing/2014/main" id="{1EA1DAFF-CECA-492F-BFA1-22C64956B8D9}"/>
-              </a:ext>
-              <a:ext uri="{C183D7F6-B498-43B3-948B-1728B52AA6E4}">
-                <adec:decorative xmlns:adec="http://schemas.microsoft.com/office/drawing/2017/decorative" val="1"/>
-              </a:ext>
-            </a:extLst>
-          </p:cNvPr>
-          <p:cNvGrpSpPr>
-            <a:grpSpLocks noGrp="1" noUngrp="1" noRot="1" noChangeAspect="1" noMove="1" noResize="1"/>
-          </p:cNvGrpSpPr>
-          <p:nvPr>
-            <p:extLst>
-              <p:ext uri="{386F3935-93C4-4BCD-93E2-E3B085C9AB24}">
-                <p16:designElem xmlns:p16="http://schemas.microsoft.com/office/powerpoint/2015/main" val="1"/>
-              </p:ext>
-            </p:extLst>
-          </p:nvPr>
-        </p:nvGrpSpPr>
-        <p:grpSpPr>
-          <a:xfrm>
-            <a:off x="1" y="2075420"/>
-            <a:ext cx="12048729" cy="4093306"/>
-            <a:chOff x="1" y="2075420"/>
-            <a:chExt cx="12048729" cy="4093306"/>
-          </a:xfrm>
-        </p:grpSpPr>
-        <p:sp>
-          <p:nvSpPr>
-            <p:cNvPr id="15" name="Oval 14">
-              <a:extLst>
-                <a:ext uri="{FF2B5EF4-FFF2-40B4-BE49-F238E27FC236}">
-                  <a16:creationId xmlns:a16="http://schemas.microsoft.com/office/drawing/2014/main" id="{5D3D3744-142C-4653-90AB-546FE6B849E3}"/>
-                </a:ext>
-                <a:ext uri="{C183D7F6-B498-43B3-948B-1728B52AA6E4}">
-                  <adec:decorative xmlns:adec="http://schemas.microsoft.com/office/drawing/2017/decorative" val="1"/>
-                </a:ext>
-              </a:extLst>
-            </p:cNvPr>
-            <p:cNvSpPr/>
-            <p:nvPr>
-              <p:extLst>
-                <p:ext uri="{386F3935-93C4-4BCD-93E2-E3B085C9AB24}">
-                  <p16:designElem xmlns:p16="http://schemas.microsoft.com/office/powerpoint/2015/main" val="1"/>
-                </p:ext>
-              </p:extLst>
-            </p:nvPr>
-          </p:nvSpPr>
-          <p:spPr>
-            <a:xfrm rot="4500000">
-              <a:off x="7942191" y="2507571"/>
-              <a:ext cx="3563871" cy="3563871"/>
-            </a:xfrm>
-            <a:prstGeom prst="ellipse">
-              <a:avLst/>
-            </a:prstGeom>
-            <a:noFill/>
-            <a:ln w="31750">
-              <a:gradFill>
-                <a:gsLst>
-                  <a:gs pos="0">
-                    <a:schemeClr val="tx2">
-                      <a:lumMod val="60000"/>
-                      <a:lumOff val="40000"/>
-                      <a:alpha val="10000"/>
-                    </a:schemeClr>
-                  </a:gs>
-                  <a:gs pos="100000">
-                    <a:schemeClr val="tx2">
-                      <a:lumMod val="50000"/>
-                      <a:alpha val="20000"/>
-                    </a:schemeClr>
-                  </a:gs>
-                </a:gsLst>
-                <a:lin ang="5400000" scaled="1"/>
-              </a:gradFill>
-              <a:prstDash val="sysDot"/>
-            </a:ln>
-          </p:spPr>
-          <p:style>
-            <a:lnRef idx="2">
-              <a:schemeClr val="accent1">
-                <a:shade val="50000"/>
-              </a:schemeClr>
-            </a:lnRef>
-            <a:fillRef idx="1">
-              <a:schemeClr val="accent1"/>
-            </a:fillRef>
-            <a:effectRef idx="0">
-              <a:schemeClr val="accent1"/>
-            </a:effectRef>
-            <a:fontRef idx="minor">
-              <a:schemeClr val="lt1"/>
-            </a:fontRef>
-          </p:style>
-          <p:txBody>
-            <a:bodyPr rtlCol="0" anchor="ctr"/>
-            <a:lstStyle/>
-            <a:p>
-              <a:pPr algn="ctr"/>
-              <a:endParaRPr lang="en-US"/>
-            </a:p>
-          </p:txBody>
-        </p:sp>
-        <p:sp>
-          <p:nvSpPr>
-            <p:cNvPr id="16" name="Oval 15">
-              <a:extLst>
-                <a:ext uri="{FF2B5EF4-FFF2-40B4-BE49-F238E27FC236}">
-                  <a16:creationId xmlns:a16="http://schemas.microsoft.com/office/drawing/2014/main" id="{0BC69CAC-820B-41BA-BFCA-79B455768377}"/>
-                </a:ext>
-                <a:ext uri="{C183D7F6-B498-43B3-948B-1728B52AA6E4}">
-                  <adec:decorative xmlns:adec="http://schemas.microsoft.com/office/drawing/2017/decorative" val="1"/>
-                </a:ext>
-              </a:extLst>
-            </p:cNvPr>
-            <p:cNvSpPr/>
-            <p:nvPr>
-              <p:extLst>
-                <p:ext uri="{386F3935-93C4-4BCD-93E2-E3B085C9AB24}">
-                  <p16:designElem xmlns:p16="http://schemas.microsoft.com/office/powerpoint/2015/main" val="1"/>
-                </p:ext>
-              </p:extLst>
-            </p:nvPr>
-          </p:nvSpPr>
-          <p:spPr>
-            <a:xfrm rot="16200000">
-              <a:off x="10435065" y="4048931"/>
-              <a:ext cx="1381607" cy="1381607"/>
-            </a:xfrm>
-            <a:prstGeom prst="ellipse">
-              <a:avLst/>
-            </a:prstGeom>
-            <a:noFill/>
-            <a:ln w="31750">
-              <a:gradFill>
-                <a:gsLst>
-                  <a:gs pos="0">
-                    <a:schemeClr val="tx2">
-                      <a:lumMod val="60000"/>
-                      <a:lumOff val="40000"/>
-                      <a:alpha val="20000"/>
-                    </a:schemeClr>
-                  </a:gs>
-                  <a:gs pos="100000">
-                    <a:schemeClr val="tx2">
-                      <a:lumMod val="50000"/>
-                      <a:alpha val="20000"/>
-                    </a:schemeClr>
-                  </a:gs>
-                </a:gsLst>
-                <a:lin ang="5400000" scaled="1"/>
-              </a:gradFill>
-              <a:prstDash val="sysDot"/>
-            </a:ln>
-          </p:spPr>
-          <p:style>
-            <a:lnRef idx="2">
-              <a:schemeClr val="accent1">
-                <a:shade val="50000"/>
-              </a:schemeClr>
-            </a:lnRef>
-            <a:fillRef idx="1">
-              <a:schemeClr val="accent1"/>
-            </a:fillRef>
-            <a:effectRef idx="0">
-              <a:schemeClr val="accent1"/>
-            </a:effectRef>
-            <a:fontRef idx="minor">
-              <a:schemeClr val="lt1"/>
-            </a:fontRef>
-          </p:style>
-          <p:txBody>
-            <a:bodyPr rtlCol="0" anchor="ctr"/>
-            <a:lstStyle/>
-            <a:p>
-              <a:pPr algn="ctr"/>
-              <a:endParaRPr lang="en-US"/>
-            </a:p>
-          </p:txBody>
-        </p:sp>
-        <p:sp>
-          <p:nvSpPr>
-            <p:cNvPr id="17" name="Oval 16">
-              <a:extLst>
-                <a:ext uri="{FF2B5EF4-FFF2-40B4-BE49-F238E27FC236}">
-                  <a16:creationId xmlns:a16="http://schemas.microsoft.com/office/drawing/2014/main" id="{3D205E7A-88AB-4C4B-B8D1-5A76AA878BF6}"/>
-                </a:ext>
-                <a:ext uri="{C183D7F6-B498-43B3-948B-1728B52AA6E4}">
-                  <adec:decorative xmlns:adec="http://schemas.microsoft.com/office/drawing/2017/decorative" val="1"/>
-                </a:ext>
-              </a:extLst>
-            </p:cNvPr>
-            <p:cNvSpPr/>
-            <p:nvPr>
-              <p:extLst>
-                <p:ext uri="{386F3935-93C4-4BCD-93E2-E3B085C9AB24}">
-                  <p16:designElem xmlns:p16="http://schemas.microsoft.com/office/powerpoint/2015/main" val="1"/>
-                </p:ext>
-              </p:extLst>
-            </p:nvPr>
-          </p:nvSpPr>
-          <p:spPr>
-            <a:xfrm rot="16200000">
-              <a:off x="1" y="2075420"/>
-              <a:ext cx="3144364" cy="3144364"/>
-            </a:xfrm>
-            <a:prstGeom prst="ellipse">
-              <a:avLst/>
-            </a:prstGeom>
-            <a:gradFill>
-              <a:gsLst>
-                <a:gs pos="0">
-                  <a:schemeClr val="tx2">
-                    <a:lumMod val="75000"/>
-                    <a:alpha val="20000"/>
-                  </a:schemeClr>
-                </a:gs>
-                <a:gs pos="100000">
-                  <a:schemeClr val="tx2">
-                    <a:lumMod val="50000"/>
-                    <a:alpha val="10000"/>
-                  </a:schemeClr>
-                </a:gs>
-              </a:gsLst>
-              <a:lin ang="5400000" scaled="1"/>
-            </a:gradFill>
-            <a:ln>
-              <a:noFill/>
-            </a:ln>
-          </p:spPr>
-          <p:style>
-            <a:lnRef idx="2">
-              <a:schemeClr val="accent1">
-                <a:shade val="50000"/>
-              </a:schemeClr>
-            </a:lnRef>
-            <a:fillRef idx="1">
-              <a:schemeClr val="accent1"/>
-            </a:fillRef>
-            <a:effectRef idx="0">
-              <a:schemeClr val="accent1"/>
-            </a:effectRef>
-            <a:fontRef idx="minor">
-              <a:schemeClr val="lt1"/>
-            </a:fontRef>
-          </p:style>
-          <p:txBody>
-            <a:bodyPr rtlCol="0" anchor="ctr"/>
-            <a:lstStyle/>
-            <a:p>
-              <a:pPr algn="ctr"/>
-              <a:endParaRPr lang="en-US"/>
-            </a:p>
-          </p:txBody>
-        </p:sp>
-        <p:sp>
-          <p:nvSpPr>
-            <p:cNvPr id="18" name="Oval 17">
-              <a:extLst>
-                <a:ext uri="{FF2B5EF4-FFF2-40B4-BE49-F238E27FC236}">
-                  <a16:creationId xmlns:a16="http://schemas.microsoft.com/office/drawing/2014/main" id="{0D4286E9-8501-4EBF-874C-74897B4B6F01}"/>
-                </a:ext>
-                <a:ext uri="{C183D7F6-B498-43B3-948B-1728B52AA6E4}">
-                  <adec:decorative xmlns:adec="http://schemas.microsoft.com/office/drawing/2017/decorative" val="1"/>
-                </a:ext>
-              </a:extLst>
-            </p:cNvPr>
-            <p:cNvSpPr/>
-            <p:nvPr>
-              <p:extLst>
-                <p:ext uri="{386F3935-93C4-4BCD-93E2-E3B085C9AB24}">
-                  <p16:designElem xmlns:p16="http://schemas.microsoft.com/office/powerpoint/2015/main" val="1"/>
-                </p:ext>
-              </p:extLst>
-            </p:nvPr>
-          </p:nvSpPr>
-          <p:spPr>
-            <a:xfrm rot="12600000">
-              <a:off x="10150845" y="4270841"/>
-              <a:ext cx="1897885" cy="1897885"/>
-            </a:xfrm>
-            <a:prstGeom prst="ellipse">
-              <a:avLst/>
-            </a:prstGeom>
-            <a:gradFill>
-              <a:gsLst>
-                <a:gs pos="0">
-                  <a:schemeClr val="tx2">
-                    <a:lumMod val="75000"/>
-                    <a:alpha val="10000"/>
-                  </a:schemeClr>
-                </a:gs>
-                <a:gs pos="100000">
-                  <a:schemeClr val="tx2">
-                    <a:lumMod val="75000"/>
-                    <a:alpha val="20000"/>
-                  </a:schemeClr>
-                </a:gs>
-              </a:gsLst>
-              <a:lin ang="5400000" scaled="1"/>
-            </a:gradFill>
-            <a:ln>
-              <a:noFill/>
-            </a:ln>
-          </p:spPr>
-          <p:style>
-            <a:lnRef idx="2">
-              <a:schemeClr val="accent1">
-                <a:shade val="50000"/>
-              </a:schemeClr>
-            </a:lnRef>
-            <a:fillRef idx="1">
-              <a:schemeClr val="accent1"/>
-            </a:fillRef>
-            <a:effectRef idx="0">
-              <a:schemeClr val="accent1"/>
-            </a:effectRef>
-            <a:fontRef idx="minor">
-              <a:schemeClr val="lt1"/>
-            </a:fontRef>
-          </p:style>
-          <p:txBody>
-            <a:bodyPr rtlCol="0" anchor="ctr"/>
-            <a:lstStyle/>
-            <a:p>
-              <a:pPr algn="ctr"/>
-              <a:endParaRPr lang="en-US" dirty="0"/>
-            </a:p>
-          </p:txBody>
-        </p:sp>
-        <p:sp>
-          <p:nvSpPr>
-            <p:cNvPr id="19" name="Oval 18">
-              <a:extLst>
-                <a:ext uri="{FF2B5EF4-FFF2-40B4-BE49-F238E27FC236}">
-                  <a16:creationId xmlns:a16="http://schemas.microsoft.com/office/drawing/2014/main" id="{45586ADC-910E-45C9-BAB4-CB0EFBEE5B17}"/>
-                </a:ext>
-                <a:ext uri="{C183D7F6-B498-43B3-948B-1728B52AA6E4}">
-                  <adec:decorative xmlns:adec="http://schemas.microsoft.com/office/drawing/2017/decorative" val="1"/>
-                </a:ext>
-              </a:extLst>
-            </p:cNvPr>
-            <p:cNvSpPr/>
-            <p:nvPr>
-              <p:extLst>
-                <p:ext uri="{386F3935-93C4-4BCD-93E2-E3B085C9AB24}">
-                  <p16:designElem xmlns:p16="http://schemas.microsoft.com/office/powerpoint/2015/main" val="1"/>
-                </p:ext>
-              </p:extLst>
-            </p:nvPr>
-          </p:nvSpPr>
-          <p:spPr>
-            <a:xfrm rot="4500000">
-              <a:off x="2046780" y="3040492"/>
-              <a:ext cx="2579322" cy="2579322"/>
-            </a:xfrm>
-            <a:prstGeom prst="ellipse">
-              <a:avLst/>
-            </a:prstGeom>
-            <a:noFill/>
-            <a:ln w="31750">
-              <a:gradFill>
-                <a:gsLst>
-                  <a:gs pos="0">
-                    <a:schemeClr val="tx2">
-                      <a:lumMod val="60000"/>
-                      <a:lumOff val="40000"/>
-                      <a:alpha val="20000"/>
-                    </a:schemeClr>
-                  </a:gs>
-                  <a:gs pos="100000">
-                    <a:schemeClr val="tx2">
-                      <a:lumMod val="50000"/>
-                      <a:alpha val="20000"/>
-                    </a:schemeClr>
-                  </a:gs>
-                </a:gsLst>
-                <a:lin ang="5400000" scaled="1"/>
-              </a:gradFill>
-              <a:prstDash val="sysDot"/>
-            </a:ln>
-          </p:spPr>
-          <p:style>
-            <a:lnRef idx="2">
-              <a:schemeClr val="accent1">
-                <a:shade val="50000"/>
-              </a:schemeClr>
-            </a:lnRef>
-            <a:fillRef idx="1">
-              <a:schemeClr val="accent1"/>
-            </a:fillRef>
-            <a:effectRef idx="0">
-              <a:schemeClr val="accent1"/>
-            </a:effectRef>
-            <a:fontRef idx="minor">
-              <a:schemeClr val="lt1"/>
-            </a:fontRef>
-          </p:style>
-          <p:txBody>
-            <a:bodyPr rtlCol="0" anchor="ctr"/>
-            <a:lstStyle/>
-            <a:p>
-              <a:pPr algn="ctr"/>
-              <a:endParaRPr lang="en-US"/>
-            </a:p>
-          </p:txBody>
-        </p:sp>
-        <p:sp>
-          <p:nvSpPr>
-            <p:cNvPr id="20" name="Oval 19">
-              <a:extLst>
-                <a:ext uri="{FF2B5EF4-FFF2-40B4-BE49-F238E27FC236}">
-                  <a16:creationId xmlns:a16="http://schemas.microsoft.com/office/drawing/2014/main" id="{DAB594C5-5BB0-49AE-8AAC-AE40A6F8A3F3}"/>
-                </a:ext>
-                <a:ext uri="{C183D7F6-B498-43B3-948B-1728B52AA6E4}">
-                  <adec:decorative xmlns:adec="http://schemas.microsoft.com/office/drawing/2017/decorative" val="1"/>
-                </a:ext>
-              </a:extLst>
-            </p:cNvPr>
-            <p:cNvSpPr/>
-            <p:nvPr>
-              <p:extLst>
-                <p:ext uri="{386F3935-93C4-4BCD-93E2-E3B085C9AB24}">
-                  <p16:designElem xmlns:p16="http://schemas.microsoft.com/office/powerpoint/2015/main" val="1"/>
-                </p:ext>
-              </p:extLst>
-            </p:nvPr>
-          </p:nvSpPr>
-          <p:spPr>
-            <a:xfrm rot="4500000">
-              <a:off x="2224640" y="3193975"/>
-              <a:ext cx="2243193" cy="2243193"/>
-            </a:xfrm>
-            <a:prstGeom prst="ellipse">
-              <a:avLst/>
-            </a:prstGeom>
-            <a:noFill/>
-            <a:ln w="31750">
-              <a:gradFill>
-                <a:gsLst>
-                  <a:gs pos="0">
-                    <a:schemeClr val="tx2">
-                      <a:lumMod val="60000"/>
-                      <a:lumOff val="40000"/>
-                      <a:alpha val="10000"/>
-                    </a:schemeClr>
-                  </a:gs>
-                  <a:gs pos="100000">
-                    <a:schemeClr val="tx2">
-                      <a:lumMod val="50000"/>
-                      <a:alpha val="10000"/>
-                    </a:schemeClr>
-                  </a:gs>
-                </a:gsLst>
-                <a:lin ang="5400000" scaled="1"/>
-              </a:gradFill>
-            </a:ln>
-          </p:spPr>
-          <p:style>
-            <a:lnRef idx="2">
-              <a:schemeClr val="accent1">
-                <a:shade val="50000"/>
-              </a:schemeClr>
-            </a:lnRef>
-            <a:fillRef idx="1">
-              <a:schemeClr val="accent1"/>
-            </a:fillRef>
-            <a:effectRef idx="0">
-              <a:schemeClr val="accent1"/>
-            </a:effectRef>
-            <a:fontRef idx="minor">
-              <a:schemeClr val="lt1"/>
-            </a:fontRef>
-          </p:style>
-          <p:txBody>
-            <a:bodyPr rtlCol="0" anchor="ctr"/>
-            <a:lstStyle/>
-            <a:p>
-              <a:pPr algn="ctr"/>
-              <a:endParaRPr lang="en-US"/>
-            </a:p>
-          </p:txBody>
-        </p:sp>
-      </p:grpSp>
-      <p:sp>
-        <p:nvSpPr>
-          <p:cNvPr id="22" name="Rectangle 21">
-            <a:extLst>
-              <a:ext uri="{FF2B5EF4-FFF2-40B4-BE49-F238E27FC236}">
-                <a16:creationId xmlns:a16="http://schemas.microsoft.com/office/drawing/2014/main" id="{B8114C98-A349-4111-A123-E8EAB86ABE30}"/>
-              </a:ext>
-              <a:ext uri="{C183D7F6-B498-43B3-948B-1728B52AA6E4}">
-                <adec:decorative xmlns:adec="http://schemas.microsoft.com/office/drawing/2017/decorative" val="1"/>
-              </a:ext>
-            </a:extLst>
-          </p:cNvPr>
-          <p:cNvSpPr>
-            <a:spLocks noGrp="1" noRot="1" noChangeAspect="1" noMove="1" noResize="1" noEditPoints="1" noAdjustHandles="1" noChangeArrowheads="1" noChangeShapeType="1" noTextEdit="1"/>
-          </p:cNvSpPr>
-          <p:nvPr>
-            <p:extLst>
-              <p:ext uri="{386F3935-93C4-4BCD-93E2-E3B085C9AB24}">
-                <p16:designElem xmlns:p16="http://schemas.microsoft.com/office/powerpoint/2015/main" val="1"/>
-              </p:ext>
-            </p:extLst>
-          </p:nvPr>
-        </p:nvSpPr>
-        <p:spPr>
-          <a:xfrm rot="16200000">
-            <a:off x="10438146" y="1042605"/>
-            <a:ext cx="2796461" cy="711252"/>
-          </a:xfrm>
-          <a:prstGeom prst="rect">
-            <a:avLst/>
-          </a:prstGeom>
-          <a:gradFill flip="none" rotWithShape="1">
-            <a:gsLst>
-              <a:gs pos="0">
-                <a:schemeClr val="tx2">
-                  <a:lumMod val="40000"/>
-                  <a:lumOff val="60000"/>
-                  <a:alpha val="0"/>
-                </a:schemeClr>
-              </a:gs>
-              <a:gs pos="100000">
-                <a:schemeClr val="tx2">
-                  <a:lumMod val="75000"/>
-                  <a:alpha val="10000"/>
-                </a:schemeClr>
-              </a:gs>
-            </a:gsLst>
-            <a:lin ang="8400000" scaled="0"/>
-            <a:tileRect/>
-          </a:gradFill>
-          <a:ln>
-            <a:noFill/>
-          </a:ln>
-        </p:spPr>
-        <p:style>
-          <a:lnRef idx="2">
-            <a:schemeClr val="accent1">
-              <a:shade val="50000"/>
-            </a:schemeClr>
-          </a:lnRef>
-          <a:fillRef idx="1">
-            <a:schemeClr val="accent1"/>
-          </a:fillRef>
-          <a:effectRef idx="0">
-            <a:schemeClr val="accent1"/>
-          </a:effectRef>
-          <a:fontRef idx="minor">
-            <a:schemeClr val="lt1"/>
-          </a:fontRef>
-        </p:style>
-        <p:txBody>
-          <a:bodyPr rtlCol="0" anchor="ctr"/>
-          <a:lstStyle/>
-          <a:p>
-            <a:pPr algn="ctr"/>
-            <a:endParaRPr lang="en-US"/>
-          </a:p>
-        </p:txBody>
-      </p:sp>
-      <p:grpSp>
-        <p:nvGrpSpPr>
-          <p:cNvPr id="24" name="Group 23">
-            <a:extLst>
-              <a:ext uri="{FF2B5EF4-FFF2-40B4-BE49-F238E27FC236}">
-                <a16:creationId xmlns:a16="http://schemas.microsoft.com/office/drawing/2014/main" id="{670FB431-AE18-414D-92F4-1D12D1991152}"/>
-              </a:ext>
-              <a:ext uri="{C183D7F6-B498-43B3-948B-1728B52AA6E4}">
-                <adec:decorative xmlns:adec="http://schemas.microsoft.com/office/drawing/2017/decorative" val="1"/>
-              </a:ext>
-            </a:extLst>
-          </p:cNvPr>
-          <p:cNvGrpSpPr>
-            <a:grpSpLocks noGrp="1" noUngrp="1" noRot="1" noChangeAspect="1" noMove="1" noResize="1"/>
-          </p:cNvGrpSpPr>
-          <p:nvPr>
-            <p:extLst>
-              <p:ext uri="{386F3935-93C4-4BCD-93E2-E3B085C9AB24}">
-                <p16:designElem xmlns:p16="http://schemas.microsoft.com/office/powerpoint/2015/main" val="1"/>
-              </p:ext>
-            </p:extLst>
-          </p:nvPr>
-        </p:nvGrpSpPr>
-        <p:grpSpPr>
-          <a:xfrm>
-            <a:off x="11259539" y="317578"/>
-            <a:ext cx="548640" cy="549007"/>
-            <a:chOff x="7029447" y="3514725"/>
-            <a:chExt cx="1285875" cy="549007"/>
-          </a:xfrm>
-        </p:grpSpPr>
-        <p:cxnSp>
-          <p:nvCxnSpPr>
-            <p:cNvPr id="25" name="Straight Connector 24">
-              <a:extLst>
-                <a:ext uri="{FF2B5EF4-FFF2-40B4-BE49-F238E27FC236}">
-                  <a16:creationId xmlns:a16="http://schemas.microsoft.com/office/drawing/2014/main" id="{24467063-D74E-4D42-8790-B9F6D69584BE}"/>
-                </a:ext>
-                <a:ext uri="{C183D7F6-B498-43B3-948B-1728B52AA6E4}">
-                  <adec:decorative xmlns:adec="http://schemas.microsoft.com/office/drawing/2017/decorative" val="1"/>
-                </a:ext>
-              </a:extLst>
-            </p:cNvPr>
-            <p:cNvCxnSpPr>
-              <a:cxnSpLocks/>
-            </p:cNvCxnSpPr>
-            <p:nvPr>
-              <p:extLst>
-                <p:ext uri="{386F3935-93C4-4BCD-93E2-E3B085C9AB24}">
-                  <p16:designElem xmlns:p16="http://schemas.microsoft.com/office/powerpoint/2015/main" val="1"/>
-                </p:ext>
-              </p:extLst>
-            </p:nvPr>
-          </p:nvCxnSpPr>
-          <p:spPr>
-            <a:xfrm>
-              <a:off x="7029447" y="3514725"/>
-              <a:ext cx="1285875" cy="0"/>
-            </a:xfrm>
-            <a:prstGeom prst="line">
-              <a:avLst/>
-            </a:prstGeom>
-            <a:ln w="31750" cap="rnd" cmpd="sng">
-              <a:gradFill>
-                <a:gsLst>
-                  <a:gs pos="0">
-                    <a:schemeClr val="tx2">
-                      <a:lumMod val="60000"/>
-                      <a:lumOff val="40000"/>
-                      <a:alpha val="40000"/>
-                    </a:schemeClr>
-                  </a:gs>
-                  <a:gs pos="100000">
-                    <a:schemeClr val="tx2">
-                      <a:lumMod val="75000"/>
-                      <a:alpha val="40000"/>
-                    </a:schemeClr>
-                  </a:gs>
-                </a:gsLst>
-                <a:lin ang="5400000" scaled="1"/>
-              </a:gradFill>
-              <a:prstDash val="sysDot"/>
-              <a:round/>
-            </a:ln>
-          </p:spPr>
-          <p:style>
-            <a:lnRef idx="1">
-              <a:schemeClr val="accent1"/>
-            </a:lnRef>
-            <a:fillRef idx="0">
-              <a:schemeClr val="accent1"/>
-            </a:fillRef>
-            <a:effectRef idx="0">
-              <a:schemeClr val="accent1"/>
-            </a:effectRef>
-            <a:fontRef idx="minor">
-              <a:schemeClr val="tx1"/>
-            </a:fontRef>
-          </p:style>
-        </p:cxnSp>
-        <p:cxnSp>
-          <p:nvCxnSpPr>
-            <p:cNvPr id="26" name="Straight Connector 25">
-              <a:extLst>
-                <a:ext uri="{FF2B5EF4-FFF2-40B4-BE49-F238E27FC236}">
-                  <a16:creationId xmlns:a16="http://schemas.microsoft.com/office/drawing/2014/main" id="{A1D19BAC-1681-47BC-AAF5-92FAFFF6F4CE}"/>
-                </a:ext>
-                <a:ext uri="{C183D7F6-B498-43B3-948B-1728B52AA6E4}">
-                  <adec:decorative xmlns:adec="http://schemas.microsoft.com/office/drawing/2017/decorative" val="1"/>
-                </a:ext>
-              </a:extLst>
-            </p:cNvPr>
-            <p:cNvCxnSpPr>
-              <a:cxnSpLocks/>
-            </p:cNvCxnSpPr>
-            <p:nvPr>
-              <p:extLst>
-                <p:ext uri="{386F3935-93C4-4BCD-93E2-E3B085C9AB24}">
-                  <p16:designElem xmlns:p16="http://schemas.microsoft.com/office/powerpoint/2015/main" val="1"/>
-                </p:ext>
-              </p:extLst>
-            </p:nvPr>
-          </p:nvCxnSpPr>
-          <p:spPr>
-            <a:xfrm>
-              <a:off x="7029447" y="3697727"/>
-              <a:ext cx="1285875" cy="0"/>
-            </a:xfrm>
-            <a:prstGeom prst="line">
-              <a:avLst/>
-            </a:prstGeom>
-            <a:ln w="31750" cap="rnd" cmpd="sng">
-              <a:gradFill>
-                <a:gsLst>
-                  <a:gs pos="0">
-                    <a:schemeClr val="tx2">
-                      <a:lumMod val="60000"/>
-                      <a:lumOff val="40000"/>
-                      <a:alpha val="40000"/>
-                    </a:schemeClr>
-                  </a:gs>
-                  <a:gs pos="100000">
-                    <a:schemeClr val="tx2">
-                      <a:lumMod val="75000"/>
-                      <a:alpha val="40000"/>
-                    </a:schemeClr>
-                  </a:gs>
-                </a:gsLst>
-                <a:lin ang="5400000" scaled="1"/>
-              </a:gradFill>
-              <a:prstDash val="sysDot"/>
-              <a:round/>
-            </a:ln>
-          </p:spPr>
-          <p:style>
-            <a:lnRef idx="1">
-              <a:schemeClr val="accent1"/>
-            </a:lnRef>
-            <a:fillRef idx="0">
-              <a:schemeClr val="accent1"/>
-            </a:fillRef>
-            <a:effectRef idx="0">
-              <a:schemeClr val="accent1"/>
-            </a:effectRef>
-            <a:fontRef idx="minor">
-              <a:schemeClr val="tx1"/>
-            </a:fontRef>
-          </p:style>
-        </p:cxnSp>
-        <p:cxnSp>
-          <p:nvCxnSpPr>
-            <p:cNvPr id="27" name="Straight Connector 26">
-              <a:extLst>
-                <a:ext uri="{FF2B5EF4-FFF2-40B4-BE49-F238E27FC236}">
-                  <a16:creationId xmlns:a16="http://schemas.microsoft.com/office/drawing/2014/main" id="{94347C2B-E846-452C-97AA-7E254FC1CE8F}"/>
-                </a:ext>
-                <a:ext uri="{C183D7F6-B498-43B3-948B-1728B52AA6E4}">
-                  <adec:decorative xmlns:adec="http://schemas.microsoft.com/office/drawing/2017/decorative" val="1"/>
-                </a:ext>
-              </a:extLst>
-            </p:cNvPr>
-            <p:cNvCxnSpPr>
-              <a:cxnSpLocks/>
-            </p:cNvCxnSpPr>
-            <p:nvPr>
-              <p:extLst>
-                <p:ext uri="{386F3935-93C4-4BCD-93E2-E3B085C9AB24}">
-                  <p16:designElem xmlns:p16="http://schemas.microsoft.com/office/powerpoint/2015/main" val="1"/>
-                </p:ext>
-              </p:extLst>
-            </p:nvPr>
-          </p:nvCxnSpPr>
-          <p:spPr>
-            <a:xfrm>
-              <a:off x="7029447" y="3880729"/>
-              <a:ext cx="1285875" cy="0"/>
-            </a:xfrm>
-            <a:prstGeom prst="line">
-              <a:avLst/>
-            </a:prstGeom>
-            <a:ln w="31750" cap="rnd" cmpd="sng">
-              <a:gradFill>
-                <a:gsLst>
-                  <a:gs pos="0">
-                    <a:schemeClr val="tx2">
-                      <a:lumMod val="60000"/>
-                      <a:lumOff val="40000"/>
-                      <a:alpha val="40000"/>
-                    </a:schemeClr>
-                  </a:gs>
-                  <a:gs pos="100000">
-                    <a:schemeClr val="tx2">
-                      <a:lumMod val="75000"/>
-                      <a:alpha val="40000"/>
-                    </a:schemeClr>
-                  </a:gs>
-                </a:gsLst>
-                <a:lin ang="5400000" scaled="1"/>
-              </a:gradFill>
-              <a:prstDash val="sysDot"/>
-              <a:round/>
-            </a:ln>
-          </p:spPr>
-          <p:style>
-            <a:lnRef idx="1">
-              <a:schemeClr val="accent1"/>
-            </a:lnRef>
-            <a:fillRef idx="0">
-              <a:schemeClr val="accent1"/>
-            </a:fillRef>
-            <a:effectRef idx="0">
-              <a:schemeClr val="accent1"/>
-            </a:effectRef>
-            <a:fontRef idx="minor">
-              <a:schemeClr val="tx1"/>
-            </a:fontRef>
-          </p:style>
-        </p:cxnSp>
-        <p:cxnSp>
-          <p:nvCxnSpPr>
-            <p:cNvPr id="28" name="Straight Connector 27">
-              <a:extLst>
-                <a:ext uri="{FF2B5EF4-FFF2-40B4-BE49-F238E27FC236}">
-                  <a16:creationId xmlns:a16="http://schemas.microsoft.com/office/drawing/2014/main" id="{10EA2B35-7959-4C2A-84AA-FF5D94FEDE90}"/>
-                </a:ext>
-                <a:ext uri="{C183D7F6-B498-43B3-948B-1728B52AA6E4}">
-                  <adec:decorative xmlns:adec="http://schemas.microsoft.com/office/drawing/2017/decorative" val="1"/>
-                </a:ext>
-              </a:extLst>
-            </p:cNvPr>
-            <p:cNvCxnSpPr>
-              <a:cxnSpLocks/>
-            </p:cNvCxnSpPr>
-            <p:nvPr>
-              <p:extLst>
-                <p:ext uri="{386F3935-93C4-4BCD-93E2-E3B085C9AB24}">
-                  <p16:designElem xmlns:p16="http://schemas.microsoft.com/office/powerpoint/2015/main" val="1"/>
-                </p:ext>
-              </p:extLst>
-            </p:nvPr>
-          </p:nvCxnSpPr>
-          <p:spPr>
-            <a:xfrm>
-              <a:off x="7029447" y="4063732"/>
-              <a:ext cx="1285875" cy="0"/>
-            </a:xfrm>
-            <a:prstGeom prst="line">
-              <a:avLst/>
-            </a:prstGeom>
-            <a:ln w="31750" cap="rnd" cmpd="sng">
-              <a:gradFill>
-                <a:gsLst>
-                  <a:gs pos="0">
-                    <a:schemeClr val="tx2">
-                      <a:lumMod val="60000"/>
-                      <a:lumOff val="40000"/>
-                      <a:alpha val="40000"/>
-                    </a:schemeClr>
-                  </a:gs>
-                  <a:gs pos="100000">
-                    <a:schemeClr val="tx2">
-                      <a:lumMod val="75000"/>
-                      <a:alpha val="40000"/>
-                    </a:schemeClr>
-                  </a:gs>
-                </a:gsLst>
-                <a:lin ang="5400000" scaled="1"/>
-              </a:gradFill>
-              <a:prstDash val="sysDot"/>
-              <a:round/>
-            </a:ln>
-          </p:spPr>
-          <p:style>
-            <a:lnRef idx="1">
-              <a:schemeClr val="accent1"/>
-            </a:lnRef>
-            <a:fillRef idx="0">
-              <a:schemeClr val="accent1"/>
-            </a:fillRef>
-            <a:effectRef idx="0">
-              <a:schemeClr val="accent1"/>
-            </a:effectRef>
-            <a:fontRef idx="minor">
-              <a:schemeClr val="tx1"/>
-            </a:fontRef>
-          </p:style>
-        </p:cxnSp>
-      </p:grpSp>
-      <p:pic>
-        <p:nvPicPr>
-          <p:cNvPr id="5" name="Picture 4">
-            <a:extLst>
-              <a:ext uri="{FF2B5EF4-FFF2-40B4-BE49-F238E27FC236}">
-                <a16:creationId xmlns:a16="http://schemas.microsoft.com/office/drawing/2014/main" id="{417DB823-C491-4CEE-BE96-DE6146C47695}"/>
-              </a:ext>
-            </a:extLst>
-          </p:cNvPr>
-          <p:cNvPicPr>
-            <a:picLocks noChangeAspect="1"/>
-          </p:cNvPicPr>
-          <p:nvPr/>
-        </p:nvPicPr>
-        <p:blipFill rotWithShape="1">
-          <a:blip r:embed="rId2"/>
-          <a:srcRect t="10529" r="1" b="15144"/>
-          <a:stretch/>
-        </p:blipFill>
-        <p:spPr>
-          <a:xfrm>
-            <a:off x="626590" y="317578"/>
-            <a:ext cx="10851111" cy="3508437"/>
-          </a:xfrm>
-          <a:prstGeom prst="rect">
-            <a:avLst/>
-          </a:prstGeom>
+          <a:effectLst/>
         </p:spPr>
       </p:pic>
-      <p:grpSp>
-        <p:nvGrpSpPr>
-          <p:cNvPr id="30" name="Group 29">
-            <a:extLst>
-              <a:ext uri="{FF2B5EF4-FFF2-40B4-BE49-F238E27FC236}">
-                <a16:creationId xmlns:a16="http://schemas.microsoft.com/office/drawing/2014/main" id="{AF19A774-30A5-488B-9BAF-629C6440294E}"/>
-              </a:ext>
-              <a:ext uri="{C183D7F6-B498-43B3-948B-1728B52AA6E4}">
-                <adec:decorative xmlns:adec="http://schemas.microsoft.com/office/drawing/2017/decorative" val="1"/>
-              </a:ext>
-            </a:extLst>
-          </p:cNvPr>
-          <p:cNvGrpSpPr>
-            <a:grpSpLocks noGrp="1" noUngrp="1" noRot="1" noChangeAspect="1" noMove="1" noResize="1"/>
-          </p:cNvGrpSpPr>
-          <p:nvPr>
-            <p:extLst>
-              <p:ext uri="{386F3935-93C4-4BCD-93E2-E3B085C9AB24}">
-                <p16:designElem xmlns:p16="http://schemas.microsoft.com/office/powerpoint/2015/main" val="1"/>
-              </p:ext>
-            </p:extLst>
-          </p:nvPr>
-        </p:nvGrpSpPr>
-        <p:grpSpPr>
-          <a:xfrm rot="16200000">
-            <a:off x="474192" y="482489"/>
-            <a:ext cx="304800" cy="429768"/>
-            <a:chOff x="215328" y="-46937"/>
-            <a:chExt cx="304800" cy="2773841"/>
-          </a:xfrm>
-        </p:grpSpPr>
-        <p:cxnSp>
-          <p:nvCxnSpPr>
-            <p:cNvPr id="31" name="Straight Connector 30">
-              <a:extLst>
-                <a:ext uri="{FF2B5EF4-FFF2-40B4-BE49-F238E27FC236}">
-                  <a16:creationId xmlns:a16="http://schemas.microsoft.com/office/drawing/2014/main" id="{291EBF88-5B98-4258-A542-14C3AF2E5225}"/>
-                </a:ext>
-                <a:ext uri="{C183D7F6-B498-43B3-948B-1728B52AA6E4}">
-                  <adec:decorative xmlns:adec="http://schemas.microsoft.com/office/drawing/2017/decorative" val="1"/>
-                </a:ext>
-              </a:extLst>
-            </p:cNvPr>
-            <p:cNvCxnSpPr>
-              <a:cxnSpLocks/>
-            </p:cNvCxnSpPr>
-            <p:nvPr>
-              <p:extLst>
-                <p:ext uri="{386F3935-93C4-4BCD-93E2-E3B085C9AB24}">
-                  <p16:designElem xmlns:p16="http://schemas.microsoft.com/office/powerpoint/2015/main" val="1"/>
-                </p:ext>
-              </p:extLst>
-            </p:nvPr>
-          </p:nvCxnSpPr>
-          <p:spPr>
-            <a:xfrm>
-              <a:off x="215328" y="-46937"/>
-              <a:ext cx="0" cy="2773841"/>
-            </a:xfrm>
-            <a:prstGeom prst="line">
-              <a:avLst/>
-            </a:prstGeom>
-            <a:ln w="25400" cmpd="sng">
-              <a:solidFill>
-                <a:schemeClr val="bg2">
-                  <a:lumMod val="60000"/>
-                  <a:lumOff val="40000"/>
-                  <a:alpha val="50000"/>
-                </a:schemeClr>
-              </a:solidFill>
-              <a:prstDash val="sysDot"/>
-            </a:ln>
-          </p:spPr>
-          <p:style>
-            <a:lnRef idx="1">
-              <a:schemeClr val="accent1"/>
-            </a:lnRef>
-            <a:fillRef idx="0">
-              <a:schemeClr val="accent1"/>
-            </a:fillRef>
-            <a:effectRef idx="0">
-              <a:schemeClr val="accent1"/>
-            </a:effectRef>
-            <a:fontRef idx="minor">
-              <a:schemeClr val="tx1"/>
-            </a:fontRef>
-          </p:style>
-        </p:cxnSp>
-        <p:cxnSp>
-          <p:nvCxnSpPr>
-            <p:cNvPr id="32" name="Straight Connector 31">
-              <a:extLst>
-                <a:ext uri="{FF2B5EF4-FFF2-40B4-BE49-F238E27FC236}">
-                  <a16:creationId xmlns:a16="http://schemas.microsoft.com/office/drawing/2014/main" id="{8FBC2D58-9E3C-490D-BD7A-61EF07EA79E4}"/>
-                </a:ext>
-                <a:ext uri="{C183D7F6-B498-43B3-948B-1728B52AA6E4}">
-                  <adec:decorative xmlns:adec="http://schemas.microsoft.com/office/drawing/2017/decorative" val="1"/>
-                </a:ext>
-              </a:extLst>
-            </p:cNvPr>
-            <p:cNvCxnSpPr>
-              <a:cxnSpLocks/>
-            </p:cNvCxnSpPr>
-            <p:nvPr>
-              <p:extLst>
-                <p:ext uri="{386F3935-93C4-4BCD-93E2-E3B085C9AB24}">
-                  <p16:designElem xmlns:p16="http://schemas.microsoft.com/office/powerpoint/2015/main" val="1"/>
-                </p:ext>
-              </p:extLst>
-            </p:nvPr>
-          </p:nvCxnSpPr>
-          <p:spPr>
-            <a:xfrm>
-              <a:off x="316928" y="-46937"/>
-              <a:ext cx="0" cy="2773841"/>
-            </a:xfrm>
-            <a:prstGeom prst="line">
-              <a:avLst/>
-            </a:prstGeom>
-            <a:ln w="25400" cmpd="sng">
-              <a:solidFill>
-                <a:schemeClr val="bg2">
-                  <a:lumMod val="60000"/>
-                  <a:lumOff val="40000"/>
-                  <a:alpha val="50000"/>
-                </a:schemeClr>
-              </a:solidFill>
-              <a:prstDash val="sysDot"/>
-            </a:ln>
-          </p:spPr>
-          <p:style>
-            <a:lnRef idx="1">
-              <a:schemeClr val="accent1"/>
-            </a:lnRef>
-            <a:fillRef idx="0">
-              <a:schemeClr val="accent1"/>
-            </a:fillRef>
-            <a:effectRef idx="0">
-              <a:schemeClr val="accent1"/>
-            </a:effectRef>
-            <a:fontRef idx="minor">
-              <a:schemeClr val="tx1"/>
-            </a:fontRef>
-          </p:style>
-        </p:cxnSp>
-        <p:cxnSp>
-          <p:nvCxnSpPr>
-            <p:cNvPr id="33" name="Straight Connector 32">
-              <a:extLst>
-                <a:ext uri="{FF2B5EF4-FFF2-40B4-BE49-F238E27FC236}">
-                  <a16:creationId xmlns:a16="http://schemas.microsoft.com/office/drawing/2014/main" id="{B6CF1BB4-1C1D-4EDE-BA26-0243FCF83BB9}"/>
-                </a:ext>
-                <a:ext uri="{C183D7F6-B498-43B3-948B-1728B52AA6E4}">
-                  <adec:decorative xmlns:adec="http://schemas.microsoft.com/office/drawing/2017/decorative" val="1"/>
-                </a:ext>
-              </a:extLst>
-            </p:cNvPr>
-            <p:cNvCxnSpPr>
-              <a:cxnSpLocks/>
-            </p:cNvCxnSpPr>
-            <p:nvPr>
-              <p:extLst>
-                <p:ext uri="{386F3935-93C4-4BCD-93E2-E3B085C9AB24}">
-                  <p16:designElem xmlns:p16="http://schemas.microsoft.com/office/powerpoint/2015/main" val="1"/>
-                </p:ext>
-              </p:extLst>
-            </p:nvPr>
-          </p:nvCxnSpPr>
-          <p:spPr>
-            <a:xfrm>
-              <a:off x="418528" y="-46937"/>
-              <a:ext cx="0" cy="2773841"/>
-            </a:xfrm>
-            <a:prstGeom prst="line">
-              <a:avLst/>
-            </a:prstGeom>
-            <a:ln w="25400" cmpd="sng">
-              <a:solidFill>
-                <a:schemeClr val="bg2">
-                  <a:lumMod val="60000"/>
-                  <a:lumOff val="40000"/>
-                  <a:alpha val="50000"/>
-                </a:schemeClr>
-              </a:solidFill>
-              <a:prstDash val="sysDot"/>
-            </a:ln>
-          </p:spPr>
-          <p:style>
-            <a:lnRef idx="1">
-              <a:schemeClr val="accent1"/>
-            </a:lnRef>
-            <a:fillRef idx="0">
-              <a:schemeClr val="accent1"/>
-            </a:fillRef>
-            <a:effectRef idx="0">
-              <a:schemeClr val="accent1"/>
-            </a:effectRef>
-            <a:fontRef idx="minor">
-              <a:schemeClr val="tx1"/>
-            </a:fontRef>
-          </p:style>
-        </p:cxnSp>
-        <p:cxnSp>
-          <p:nvCxnSpPr>
-            <p:cNvPr id="34" name="Straight Connector 33">
-              <a:extLst>
-                <a:ext uri="{FF2B5EF4-FFF2-40B4-BE49-F238E27FC236}">
-                  <a16:creationId xmlns:a16="http://schemas.microsoft.com/office/drawing/2014/main" id="{00C83729-E02F-4512-AFE7-F4792228BDA2}"/>
-                </a:ext>
-                <a:ext uri="{C183D7F6-B498-43B3-948B-1728B52AA6E4}">
-                  <adec:decorative xmlns:adec="http://schemas.microsoft.com/office/drawing/2017/decorative" val="1"/>
-                </a:ext>
-              </a:extLst>
-            </p:cNvPr>
-            <p:cNvCxnSpPr>
-              <a:cxnSpLocks/>
-            </p:cNvCxnSpPr>
-            <p:nvPr>
-              <p:extLst>
-                <p:ext uri="{386F3935-93C4-4BCD-93E2-E3B085C9AB24}">
-                  <p16:designElem xmlns:p16="http://schemas.microsoft.com/office/powerpoint/2015/main" val="1"/>
-                </p:ext>
-              </p:extLst>
-            </p:nvPr>
-          </p:nvCxnSpPr>
-          <p:spPr>
-            <a:xfrm>
-              <a:off x="520128" y="-46937"/>
-              <a:ext cx="0" cy="2773841"/>
-            </a:xfrm>
-            <a:prstGeom prst="line">
-              <a:avLst/>
-            </a:prstGeom>
-            <a:ln w="25400" cmpd="sng">
-              <a:solidFill>
-                <a:schemeClr val="bg2">
-                  <a:lumMod val="60000"/>
-                  <a:lumOff val="40000"/>
-                  <a:alpha val="50000"/>
-                </a:schemeClr>
-              </a:solidFill>
-              <a:prstDash val="sysDot"/>
-            </a:ln>
-          </p:spPr>
-          <p:style>
-            <a:lnRef idx="1">
-              <a:schemeClr val="accent1"/>
-            </a:lnRef>
-            <a:fillRef idx="0">
-              <a:schemeClr val="accent1"/>
-            </a:fillRef>
-            <a:effectRef idx="0">
-              <a:schemeClr val="accent1"/>
-            </a:effectRef>
-            <a:fontRef idx="minor">
-              <a:schemeClr val="tx1"/>
-            </a:fontRef>
-          </p:style>
-        </p:cxnSp>
-      </p:grpSp>
-      <p:sp>
-        <p:nvSpPr>
-          <p:cNvPr id="36" name="Rectangle 35">
-            <a:extLst>
-              <a:ext uri="{FF2B5EF4-FFF2-40B4-BE49-F238E27FC236}">
-                <a16:creationId xmlns:a16="http://schemas.microsoft.com/office/drawing/2014/main" id="{E2D3D3F2-ABBB-4453-B1C5-1BEBF7E4DD56}"/>
-              </a:ext>
-              <a:ext uri="{C183D7F6-B498-43B3-948B-1728B52AA6E4}">
-                <adec:decorative xmlns:adec="http://schemas.microsoft.com/office/drawing/2017/decorative" val="1"/>
-              </a:ext>
-            </a:extLst>
-          </p:cNvPr>
-          <p:cNvSpPr>
-            <a:spLocks noGrp="1" noRot="1" noChangeAspect="1" noMove="1" noResize="1" noEditPoints="1" noAdjustHandles="1" noChangeArrowheads="1" noChangeShapeType="1" noTextEdit="1"/>
-          </p:cNvSpPr>
-          <p:nvPr>
-            <p:extLst>
-              <p:ext uri="{386F3935-93C4-4BCD-93E2-E3B085C9AB24}">
-                <p16:designElem xmlns:p16="http://schemas.microsoft.com/office/powerpoint/2015/main" val="1"/>
-              </p:ext>
-            </p:extLst>
-          </p:nvPr>
-        </p:nvSpPr>
-        <p:spPr>
-          <a:xfrm rot="10800000">
-            <a:off x="-1" y="6140785"/>
-            <a:ext cx="6095997" cy="711252"/>
-          </a:xfrm>
-          <a:prstGeom prst="rect">
-            <a:avLst/>
-          </a:prstGeom>
-          <a:gradFill flip="none" rotWithShape="1">
-            <a:gsLst>
-              <a:gs pos="10000">
-                <a:schemeClr val="tx2">
-                  <a:lumMod val="50000"/>
-                  <a:alpha val="10000"/>
-                </a:schemeClr>
-              </a:gs>
-              <a:gs pos="100000">
-                <a:schemeClr val="tx2">
-                  <a:lumMod val="60000"/>
-                  <a:lumOff val="40000"/>
-                  <a:alpha val="0"/>
-                </a:schemeClr>
-              </a:gs>
-            </a:gsLst>
-            <a:lin ang="8400000" scaled="0"/>
-            <a:tileRect/>
-          </a:gradFill>
-          <a:ln>
-            <a:noFill/>
-          </a:ln>
-        </p:spPr>
-        <p:style>
-          <a:lnRef idx="2">
-            <a:schemeClr val="accent1">
-              <a:shade val="50000"/>
-            </a:schemeClr>
-          </a:lnRef>
-          <a:fillRef idx="1">
-            <a:schemeClr val="accent1"/>
-          </a:fillRef>
-          <a:effectRef idx="0">
-            <a:schemeClr val="accent1"/>
-          </a:effectRef>
-          <a:fontRef idx="minor">
-            <a:schemeClr val="lt1"/>
-          </a:fontRef>
-        </p:style>
-        <p:txBody>
-          <a:bodyPr rtlCol="0" anchor="ctr"/>
-          <a:lstStyle/>
-          <a:p>
-            <a:pPr algn="ctr"/>
-            <a:endParaRPr lang="en-US"/>
-          </a:p>
-        </p:txBody>
-      </p:sp>
-      <p:grpSp>
-        <p:nvGrpSpPr>
-          <p:cNvPr id="38" name="Group 37">
-            <a:extLst>
-              <a:ext uri="{FF2B5EF4-FFF2-40B4-BE49-F238E27FC236}">
-                <a16:creationId xmlns:a16="http://schemas.microsoft.com/office/drawing/2014/main" id="{8214E4A5-A0D2-42C4-8D14-D2A7E495F041}"/>
-              </a:ext>
-              <a:ext uri="{C183D7F6-B498-43B3-948B-1728B52AA6E4}">
-                <adec:decorative xmlns:adec="http://schemas.microsoft.com/office/drawing/2017/decorative" val="1"/>
-              </a:ext>
-            </a:extLst>
-          </p:cNvPr>
-          <p:cNvGrpSpPr>
-            <a:grpSpLocks noGrp="1" noUngrp="1" noRot="1" noChangeAspect="1" noMove="1" noResize="1"/>
-          </p:cNvGrpSpPr>
-          <p:nvPr>
-            <p:extLst>
-              <p:ext uri="{386F3935-93C4-4BCD-93E2-E3B085C9AB24}">
-                <p16:designElem xmlns:p16="http://schemas.microsoft.com/office/powerpoint/2015/main" val="1"/>
-              </p:ext>
-            </p:extLst>
-          </p:nvPr>
-        </p:nvGrpSpPr>
-        <p:grpSpPr>
-          <a:xfrm rot="5400000">
-            <a:off x="616345" y="5940560"/>
-            <a:ext cx="1285875" cy="549007"/>
-            <a:chOff x="7029447" y="3514725"/>
-            <a:chExt cx="1285875" cy="549007"/>
-          </a:xfrm>
-        </p:grpSpPr>
-        <p:cxnSp>
-          <p:nvCxnSpPr>
-            <p:cNvPr id="39" name="Straight Connector 38">
-              <a:extLst>
-                <a:ext uri="{FF2B5EF4-FFF2-40B4-BE49-F238E27FC236}">
-                  <a16:creationId xmlns:a16="http://schemas.microsoft.com/office/drawing/2014/main" id="{7494D7A0-6B21-41E8-A7D3-0033BBB79156}"/>
-                </a:ext>
-                <a:ext uri="{C183D7F6-B498-43B3-948B-1728B52AA6E4}">
-                  <adec:decorative xmlns:adec="http://schemas.microsoft.com/office/drawing/2017/decorative" val="1"/>
-                </a:ext>
-              </a:extLst>
-            </p:cNvPr>
-            <p:cNvCxnSpPr>
-              <a:cxnSpLocks/>
-            </p:cNvCxnSpPr>
-            <p:nvPr>
-              <p:extLst>
-                <p:ext uri="{386F3935-93C4-4BCD-93E2-E3B085C9AB24}">
-                  <p16:designElem xmlns:p16="http://schemas.microsoft.com/office/powerpoint/2015/main" val="1"/>
-                </p:ext>
-              </p:extLst>
-            </p:nvPr>
-          </p:nvCxnSpPr>
-          <p:spPr>
-            <a:xfrm>
-              <a:off x="7029447" y="3514725"/>
-              <a:ext cx="1285875" cy="0"/>
-            </a:xfrm>
-            <a:prstGeom prst="line">
-              <a:avLst/>
-            </a:prstGeom>
-            <a:ln w="31750" cap="rnd" cmpd="sng">
-              <a:gradFill>
-                <a:gsLst>
-                  <a:gs pos="0">
-                    <a:schemeClr val="tx2">
-                      <a:lumMod val="60000"/>
-                      <a:lumOff val="40000"/>
-                      <a:alpha val="40000"/>
-                    </a:schemeClr>
-                  </a:gs>
-                  <a:gs pos="100000">
-                    <a:schemeClr val="tx2">
-                      <a:lumMod val="50000"/>
-                      <a:alpha val="40000"/>
-                    </a:schemeClr>
-                  </a:gs>
-                </a:gsLst>
-                <a:lin ang="5400000" scaled="1"/>
-              </a:gradFill>
-              <a:prstDash val="sysDot"/>
-              <a:round/>
-            </a:ln>
-          </p:spPr>
-          <p:style>
-            <a:lnRef idx="1">
-              <a:schemeClr val="accent1"/>
-            </a:lnRef>
-            <a:fillRef idx="0">
-              <a:schemeClr val="accent1"/>
-            </a:fillRef>
-            <a:effectRef idx="0">
-              <a:schemeClr val="accent1"/>
-            </a:effectRef>
-            <a:fontRef idx="minor">
-              <a:schemeClr val="tx1"/>
-            </a:fontRef>
-          </p:style>
-        </p:cxnSp>
-        <p:cxnSp>
-          <p:nvCxnSpPr>
-            <p:cNvPr id="40" name="Straight Connector 39">
-              <a:extLst>
-                <a:ext uri="{FF2B5EF4-FFF2-40B4-BE49-F238E27FC236}">
-                  <a16:creationId xmlns:a16="http://schemas.microsoft.com/office/drawing/2014/main" id="{1E141D7D-32B0-448E-A666-EA8703AFCF2C}"/>
-                </a:ext>
-                <a:ext uri="{C183D7F6-B498-43B3-948B-1728B52AA6E4}">
-                  <adec:decorative xmlns:adec="http://schemas.microsoft.com/office/drawing/2017/decorative" val="1"/>
-                </a:ext>
-              </a:extLst>
-            </p:cNvPr>
-            <p:cNvCxnSpPr>
-              <a:cxnSpLocks/>
-            </p:cNvCxnSpPr>
-            <p:nvPr>
-              <p:extLst>
-                <p:ext uri="{386F3935-93C4-4BCD-93E2-E3B085C9AB24}">
-                  <p16:designElem xmlns:p16="http://schemas.microsoft.com/office/powerpoint/2015/main" val="1"/>
-                </p:ext>
-              </p:extLst>
-            </p:nvPr>
-          </p:nvCxnSpPr>
-          <p:spPr>
-            <a:xfrm>
-              <a:off x="7029447" y="3697727"/>
-              <a:ext cx="1285875" cy="0"/>
-            </a:xfrm>
-            <a:prstGeom prst="line">
-              <a:avLst/>
-            </a:prstGeom>
-            <a:ln w="31750" cap="rnd" cmpd="sng">
-              <a:gradFill>
-                <a:gsLst>
-                  <a:gs pos="0">
-                    <a:schemeClr val="tx2">
-                      <a:lumMod val="60000"/>
-                      <a:lumOff val="40000"/>
-                      <a:alpha val="40000"/>
-                    </a:schemeClr>
-                  </a:gs>
-                  <a:gs pos="100000">
-                    <a:schemeClr val="tx2">
-                      <a:lumMod val="50000"/>
-                      <a:alpha val="40000"/>
-                    </a:schemeClr>
-                  </a:gs>
-                </a:gsLst>
-                <a:lin ang="5400000" scaled="1"/>
-              </a:gradFill>
-              <a:prstDash val="sysDot"/>
-              <a:round/>
-            </a:ln>
-          </p:spPr>
-          <p:style>
-            <a:lnRef idx="1">
-              <a:schemeClr val="accent1"/>
-            </a:lnRef>
-            <a:fillRef idx="0">
-              <a:schemeClr val="accent1"/>
-            </a:fillRef>
-            <a:effectRef idx="0">
-              <a:schemeClr val="accent1"/>
-            </a:effectRef>
-            <a:fontRef idx="minor">
-              <a:schemeClr val="tx1"/>
-            </a:fontRef>
-          </p:style>
-        </p:cxnSp>
-        <p:cxnSp>
-          <p:nvCxnSpPr>
-            <p:cNvPr id="41" name="Straight Connector 40">
-              <a:extLst>
-                <a:ext uri="{FF2B5EF4-FFF2-40B4-BE49-F238E27FC236}">
-                  <a16:creationId xmlns:a16="http://schemas.microsoft.com/office/drawing/2014/main" id="{8D87E268-6345-420F-8B97-B37ED04100EC}"/>
-                </a:ext>
-                <a:ext uri="{C183D7F6-B498-43B3-948B-1728B52AA6E4}">
-                  <adec:decorative xmlns:adec="http://schemas.microsoft.com/office/drawing/2017/decorative" val="1"/>
-                </a:ext>
-              </a:extLst>
-            </p:cNvPr>
-            <p:cNvCxnSpPr>
-              <a:cxnSpLocks/>
-            </p:cNvCxnSpPr>
-            <p:nvPr>
-              <p:extLst>
-                <p:ext uri="{386F3935-93C4-4BCD-93E2-E3B085C9AB24}">
-                  <p16:designElem xmlns:p16="http://schemas.microsoft.com/office/powerpoint/2015/main" val="1"/>
-                </p:ext>
-              </p:extLst>
-            </p:nvPr>
-          </p:nvCxnSpPr>
-          <p:spPr>
-            <a:xfrm>
-              <a:off x="7029447" y="3880729"/>
-              <a:ext cx="1285875" cy="0"/>
-            </a:xfrm>
-            <a:prstGeom prst="line">
-              <a:avLst/>
-            </a:prstGeom>
-            <a:ln w="31750" cap="rnd" cmpd="sng">
-              <a:gradFill>
-                <a:gsLst>
-                  <a:gs pos="0">
-                    <a:schemeClr val="tx2">
-                      <a:lumMod val="60000"/>
-                      <a:lumOff val="40000"/>
-                      <a:alpha val="40000"/>
-                    </a:schemeClr>
-                  </a:gs>
-                  <a:gs pos="100000">
-                    <a:schemeClr val="tx2">
-                      <a:lumMod val="50000"/>
-                      <a:alpha val="40000"/>
-                    </a:schemeClr>
-                  </a:gs>
-                </a:gsLst>
-                <a:lin ang="5400000" scaled="1"/>
-              </a:gradFill>
-              <a:prstDash val="sysDot"/>
-              <a:round/>
-            </a:ln>
-          </p:spPr>
-          <p:style>
-            <a:lnRef idx="1">
-              <a:schemeClr val="accent1"/>
-            </a:lnRef>
-            <a:fillRef idx="0">
-              <a:schemeClr val="accent1"/>
-            </a:fillRef>
-            <a:effectRef idx="0">
-              <a:schemeClr val="accent1"/>
-            </a:effectRef>
-            <a:fontRef idx="minor">
-              <a:schemeClr val="tx1"/>
-            </a:fontRef>
-          </p:style>
-        </p:cxnSp>
-        <p:cxnSp>
-          <p:nvCxnSpPr>
-            <p:cNvPr id="42" name="Straight Connector 41">
-              <a:extLst>
-                <a:ext uri="{FF2B5EF4-FFF2-40B4-BE49-F238E27FC236}">
-                  <a16:creationId xmlns:a16="http://schemas.microsoft.com/office/drawing/2014/main" id="{35E1622E-7FA6-4760-A2BF-A8105EBF7BB9}"/>
-                </a:ext>
-                <a:ext uri="{C183D7F6-B498-43B3-948B-1728B52AA6E4}">
-                  <adec:decorative xmlns:adec="http://schemas.microsoft.com/office/drawing/2017/decorative" val="1"/>
-                </a:ext>
-              </a:extLst>
-            </p:cNvPr>
-            <p:cNvCxnSpPr>
-              <a:cxnSpLocks/>
-            </p:cNvCxnSpPr>
-            <p:nvPr>
-              <p:extLst>
-                <p:ext uri="{386F3935-93C4-4BCD-93E2-E3B085C9AB24}">
-                  <p16:designElem xmlns:p16="http://schemas.microsoft.com/office/powerpoint/2015/main" val="1"/>
-                </p:ext>
-              </p:extLst>
-            </p:nvPr>
-          </p:nvCxnSpPr>
-          <p:spPr>
-            <a:xfrm>
-              <a:off x="7029447" y="4063732"/>
-              <a:ext cx="1285875" cy="0"/>
-            </a:xfrm>
-            <a:prstGeom prst="line">
-              <a:avLst/>
-            </a:prstGeom>
-            <a:ln w="31750" cap="rnd" cmpd="sng">
-              <a:gradFill>
-                <a:gsLst>
-                  <a:gs pos="0">
-                    <a:schemeClr val="tx2">
-                      <a:lumMod val="60000"/>
-                      <a:lumOff val="40000"/>
-                      <a:alpha val="40000"/>
-                    </a:schemeClr>
-                  </a:gs>
-                  <a:gs pos="100000">
-                    <a:schemeClr val="tx2">
-                      <a:lumMod val="50000"/>
-                      <a:alpha val="40000"/>
-                    </a:schemeClr>
-                  </a:gs>
-                </a:gsLst>
-                <a:lin ang="5400000" scaled="1"/>
-              </a:gradFill>
-              <a:prstDash val="sysDot"/>
-              <a:round/>
-            </a:ln>
-          </p:spPr>
-          <p:style>
-            <a:lnRef idx="1">
-              <a:schemeClr val="accent1"/>
-            </a:lnRef>
-            <a:fillRef idx="0">
-              <a:schemeClr val="accent1"/>
-            </a:fillRef>
-            <a:effectRef idx="0">
-              <a:schemeClr val="accent1"/>
-            </a:effectRef>
-            <a:fontRef idx="minor">
-              <a:schemeClr val="tx1"/>
-            </a:fontRef>
-          </p:style>
-        </p:cxnSp>
-      </p:grpSp>
+    </p:spTree>
+    <p:extLst>
+      <p:ext uri="{BB962C8B-B14F-4D97-AF65-F5344CB8AC3E}">
+        <p14:creationId xmlns:p14="http://schemas.microsoft.com/office/powerpoint/2010/main" val="1328006316"/>
+      </p:ext>
+    </p:extLst>
+  </p:cSld>
+  <p:clrMapOvr>
+    <a:overrideClrMapping bg1="dk1" tx1="lt1" bg2="dk2" tx2="lt2" accent1="accent1" accent2="accent2" accent3="accent3" accent4="accent4" accent5="accent5" accent6="accent6" hlink="hlink" folHlink="folHlink"/>
+  </p:clrMapOvr>
+</p:sld>
+</file>
+
+<file path=ppt/slides/slide6.xml><?xml version="1.0" encoding="utf-8"?>
+<p:sld xmlns:a="http://schemas.openxmlformats.org/drawingml/2006/main" xmlns:r="http://schemas.openxmlformats.org/officeDocument/2006/relationships" xmlns:p="http://schemas.openxmlformats.org/presentationml/2006/main">
+  <p:cSld>
+    <p:bg>
+      <p:bgPr>
+        <a:solidFill>
+          <a:schemeClr val="bg1">
+            <a:tint val="95000"/>
+            <a:satMod val="170000"/>
+          </a:schemeClr>
+        </a:solidFill>
+        <a:effectLst/>
+      </p:bgPr>
+    </p:bg>
+    <p:spTree>
+      <p:nvGrpSpPr>
+        <p:cNvPr id="1" name=""/>
+        <p:cNvGrpSpPr/>
+        <p:nvPr/>
+      </p:nvGrpSpPr>
+      <p:grpSpPr>
+        <a:xfrm>
+          <a:off x="0" y="0"/>
+          <a:ext cx="0" cy="0"/>
+          <a:chOff x="0" y="0"/>
+          <a:chExt cx="0" cy="0"/>
+        </a:xfrm>
+      </p:grpSpPr>
       <p:sp>
         <p:nvSpPr>
           <p:cNvPr id="2" name="Title 1">
@@ -10598,68 +9215,104 @@
         </p:nvSpPr>
         <p:spPr>
           <a:xfrm>
-            <a:off x="630936" y="4018137"/>
-            <a:ext cx="4569060" cy="2129586"/>
+            <a:off x="804673" y="4385066"/>
+            <a:ext cx="10694902" cy="1317643"/>
           </a:xfrm>
-          <a:noFill/>
         </p:spPr>
         <p:txBody>
-          <a:bodyPr anchor="t">
+          <a:bodyPr vert="horz" lIns="91440" tIns="45720" rIns="91440" bIns="45720" rtlCol="0" anchor="b">
             <a:normAutofit/>
           </a:bodyPr>
           <a:lstStyle/>
           <a:p>
             <a:r>
-              <a:rPr lang="en-US" sz="4800" dirty="0">
-                <a:solidFill>
-                  <a:schemeClr val="bg1"/>
-                </a:solidFill>
-              </a:rPr>
+              <a:rPr lang="en-US" sz="5400" dirty="0"/>
               <a:t>Simulation in Proteus</a:t>
             </a:r>
           </a:p>
         </p:txBody>
       </p:sp>
-      <p:sp>
-        <p:nvSpPr>
-          <p:cNvPr id="3" name="Content Placeholder 2">
-            <a:extLst>
-              <a:ext uri="{FF2B5EF4-FFF2-40B4-BE49-F238E27FC236}">
-                <a16:creationId xmlns:a16="http://schemas.microsoft.com/office/drawing/2014/main" id="{6D9179FA-6EF1-4BA4-A260-255FFC283D08}"/>
-              </a:ext>
-            </a:extLst>
-          </p:cNvPr>
-          <p:cNvSpPr>
-            <a:spLocks noGrp="1"/>
-          </p:cNvSpPr>
-          <p:nvPr>
-            <p:ph idx="1"/>
-          </p:nvPr>
-        </p:nvSpPr>
+      <p:pic>
+        <p:nvPicPr>
+          <p:cNvPr id="6" name="Picture 5">
+            <a:extLst>
+              <a:ext uri="{FF2B5EF4-FFF2-40B4-BE49-F238E27FC236}">
+                <a16:creationId xmlns:a16="http://schemas.microsoft.com/office/drawing/2014/main" id="{2588BE5B-DC67-4571-A221-BA6E473CE511}"/>
+              </a:ext>
+            </a:extLst>
+          </p:cNvPr>
+          <p:cNvPicPr>
+            <a:picLocks noChangeAspect="1"/>
+          </p:cNvPicPr>
+          <p:nvPr/>
+        </p:nvPicPr>
+        <p:blipFill rotWithShape="1">
+          <a:blip r:embed="rId2"/>
+          <a:srcRect t="3710" b="27048"/>
+          <a:stretch/>
+        </p:blipFill>
         <p:spPr>
           <a:xfrm>
-            <a:off x="5486080" y="4018143"/>
-            <a:ext cx="5674105" cy="2129599"/>
+            <a:off x="20" y="10"/>
+            <a:ext cx="12191980" cy="4242125"/>
           </a:xfrm>
-          <a:noFill/>
+          <a:prstGeom prst="rect">
+            <a:avLst/>
+          </a:prstGeom>
         </p:spPr>
-        <p:txBody>
-          <a:bodyPr anchor="t">
-            <a:normAutofit/>
-          </a:bodyPr>
-          <a:lstStyle/>
-          <a:p>
-            <a:r>
-              <a:rPr lang="en-US" sz="1800" dirty="0">
-                <a:solidFill>
-                  <a:schemeClr val="bg1"/>
-                </a:solidFill>
-              </a:rPr>
-              <a:t>&lt;Replace the image!!!!!!!!!&gt;</a:t>
-            </a:r>
-          </a:p>
-        </p:txBody>
-      </p:sp>
+      </p:pic>
+      <p:cxnSp>
+        <p:nvCxnSpPr>
+          <p:cNvPr id="49" name="Straight Connector 46">
+            <a:extLst>
+              <a:ext uri="{FF2B5EF4-FFF2-40B4-BE49-F238E27FC236}">
+                <a16:creationId xmlns:a16="http://schemas.microsoft.com/office/drawing/2014/main" id="{C800968E-0A99-46C4-A9B2-6A63AC66F4B0}"/>
+              </a:ext>
+              <a:ext uri="{C183D7F6-B498-43B3-948B-1728B52AA6E4}">
+                <adec:decorative xmlns:adec="http://schemas.microsoft.com/office/drawing/2017/decorative" val="1"/>
+              </a:ext>
+            </a:extLst>
+          </p:cNvPr>
+          <p:cNvCxnSpPr>
+            <a:cxnSpLocks noGrp="1" noRot="1" noChangeAspect="1" noMove="1" noResize="1" noEditPoints="1" noAdjustHandles="1" noChangeArrowheads="1" noChangeShapeType="1"/>
+          </p:cNvCxnSpPr>
+          <p:nvPr>
+            <p:extLst>
+              <p:ext uri="{386F3935-93C4-4BCD-93E2-E3B085C9AB24}">
+                <p16:designElem xmlns:p16="http://schemas.microsoft.com/office/powerpoint/2015/main" val="1"/>
+              </p:ext>
+            </p:extLst>
+          </p:nvPr>
+        </p:nvCxnSpPr>
+        <p:spPr>
+          <a:xfrm>
+            <a:off x="-2" y="4242136"/>
+            <a:ext cx="12192002" cy="0"/>
+          </a:xfrm>
+          <a:prstGeom prst="line">
+            <a:avLst/>
+          </a:prstGeom>
+          <a:ln w="101600">
+            <a:solidFill>
+              <a:schemeClr val="tx1"/>
+            </a:solidFill>
+          </a:ln>
+        </p:spPr>
+        <p:style>
+          <a:lnRef idx="1">
+            <a:schemeClr val="accent1"/>
+          </a:lnRef>
+          <a:fillRef idx="0">
+            <a:schemeClr val="accent1"/>
+          </a:fillRef>
+          <a:effectRef idx="0">
+            <a:schemeClr val="accent1"/>
+          </a:effectRef>
+          <a:fontRef idx="minor">
+            <a:schemeClr val="tx1"/>
+          </a:fontRef>
+        </p:style>
+      </p:cxnSp>
     </p:spTree>
     <p:extLst>
       <p:ext uri="{BB962C8B-B14F-4D97-AF65-F5344CB8AC3E}">
@@ -10668,12 +9321,12 @@
     </p:extLst>
   </p:cSld>
   <p:clrMapOvr>
-    <a:masterClrMapping/>
+    <a:overrideClrMapping bg1="dk1" tx1="lt1" bg2="dk2" tx2="lt2" accent1="accent1" accent2="accent2" accent3="accent3" accent4="accent4" accent5="accent5" accent6="accent6" hlink="hlink" folHlink="folHlink"/>
   </p:clrMapOvr>
 </p:sld>
 </file>
 
-<file path=ppt/slides/slide6.xml><?xml version="1.0" encoding="utf-8"?>
+<file path=ppt/slides/slide7.xml><?xml version="1.0" encoding="utf-8"?>
 <p:sld xmlns:a="http://schemas.openxmlformats.org/drawingml/2006/main" xmlns:r="http://schemas.openxmlformats.org/officeDocument/2006/relationships" xmlns:p="http://schemas.openxmlformats.org/presentationml/2006/main">
   <p:cSld>
     <p:bg>
@@ -11533,7 +10186,7 @@
 </p:sld>
 </file>
 
-<file path=ppt/slides/slide7.xml><?xml version="1.0" encoding="utf-8"?>
+<file path=ppt/slides/slide8.xml><?xml version="1.0" encoding="utf-8"?>
 <p:sld xmlns:a="http://schemas.openxmlformats.org/drawingml/2006/main" xmlns:r="http://schemas.openxmlformats.org/officeDocument/2006/relationships" xmlns:p="http://schemas.openxmlformats.org/presentationml/2006/main">
   <p:cSld>
     <p:bg>

</xml_diff>